<commit_message>
Corrected a few mistakes in the presentation.
</commit_message>
<xml_diff>
--- a/Resources/PresentationMaterials/Tom the IEP Assistant.pptx
+++ b/Resources/PresentationMaterials/Tom the IEP Assistant.pptx
@@ -9163,7 +9163,7 @@
             </a:r>
             <a:r>
               <a:rPr lang="en"/>
-              <a:t> Education Plan(IEP) is a map of the special services a student needs to succeed with their disability.</a:t>
+              <a:t> Education Plan (IEP) is a map of the special services a student needs to succeed with their disability.</a:t>
             </a:r>
             <a:endParaRPr/>
           </a:p>
@@ -9195,7 +9195,7 @@
             </a:pPr>
             <a:r>
               <a:rPr lang="en"/>
-              <a:t>So long as schools were still open during the COVID-19 pandemic(including remote learning) they are required to still serve students with IEPs. However, many schools struggled to properly do this.</a:t>
+              <a:t>So long as schools were still open during the COVID-19 pandemic (including remote learning) they are required to still serve students with IEPs. However, many schools struggled to properly do this.</a:t>
             </a:r>
             <a:endParaRPr/>
           </a:p>
@@ -9401,7 +9401,7 @@
             </a:pPr>
             <a:r>
               <a:rPr lang="en"/>
-              <a:t>Fun Fact: Tom is named after former Iowa Senator Tom Harkin who introduced Individuals with Disabilities Education Act</a:t>
+              <a:t>Fun Fact: Tom is named after former Iowa Senator Tom Harkin who introduced the Individuals with Disabilities Education Act.</a:t>
             </a:r>
             <a:endParaRPr/>
           </a:p>
@@ -9546,7 +9546,7 @@
             </a:pPr>
             <a:r>
               <a:rPr lang="en"/>
-              <a:t>Tom was inspired by my mother’s(a special needs educators) increased frustration and concern for her students when schools were not properly following their IEPs at the start of the COVID-19 pandemic leaving students with disabilities left behind. In addition, Tom supports setting up an IEP as my mother also explained the challenges many families go through with setting up an IEP for their child.</a:t>
+              <a:t>Tom was inspired by my mother’s (a special needs educators) increased frustration and concern for her students when schools were not properly following their IEPs at the start of the COVID-19 pandemic leaving students with disabilities left behind. In addition, Tom supports setting up an IEP as my mother also explained the challenges many families go through with setting up an IEP for their child.</a:t>
             </a:r>
             <a:endParaRPr/>
           </a:p>
@@ -9778,7 +9778,7 @@
             </a:pPr>
             <a:r>
               <a:rPr lang="en"/>
-              <a:t>Tom utilizes Language Understanding(LUIS) for understanding the user and responding to them correctly.</a:t>
+              <a:t>Tom utilizes Language Understanding (LUIS) for understanding the user and responding to them correctly.</a:t>
             </a:r>
             <a:endParaRPr/>
           </a:p>
@@ -10119,7 +10119,7 @@
             </a:pPr>
             <a:r>
               <a:rPr lang="en"/>
-              <a:t>Following an iterative approach(in order to incorporate feedback from my mother’s clients) with a limited timeline</a:t>
+              <a:t>Following an iterative approach (in order to incorporate feedback from my mother’s clients) with a limited timeline.</a:t>
             </a:r>
             <a:endParaRPr/>
           </a:p>
@@ -10264,7 +10264,7 @@
             </a:pPr>
             <a:r>
               <a:rPr lang="en"/>
-              <a:t>Add chat bot features for correcting things such as somebody’s name or email(this was not added solely based on time constraints).</a:t>
+              <a:t>Add chat bot features for correcting things such as somebody’s name or email (this was not added solely based on time constraints).</a:t>
             </a:r>
             <a:endParaRPr/>
           </a:p>
@@ -10376,6 +10376,285 @@
 </file>
 
 <file path=ppt/theme/theme1.xml><?xml version="1.0" encoding="utf-8"?>
+<a:theme xmlns:a="http://schemas.openxmlformats.org/drawingml/2006/main" xmlns:r="http://schemas.openxmlformats.org/officeDocument/2006/relationships" name="Geometric">
+  <a:themeElements>
+    <a:clrScheme name="Geometric">
+      <a:dk1>
+        <a:srgbClr val="2A3990"/>
+      </a:dk1>
+      <a:lt1>
+        <a:srgbClr val="FFFFFF"/>
+      </a:lt1>
+      <a:dk2>
+        <a:srgbClr val="434343"/>
+      </a:dk2>
+      <a:lt2>
+        <a:srgbClr val="999999"/>
+      </a:lt2>
+      <a:accent1>
+        <a:srgbClr val="212D74"/>
+      </a:accent1>
+      <a:accent2>
+        <a:srgbClr val="3949AB"/>
+      </a:accent2>
+      <a:accent3>
+        <a:srgbClr val="9C254D"/>
+      </a:accent3>
+      <a:accent4>
+        <a:srgbClr val="D23369"/>
+      </a:accent4>
+      <a:accent5>
+        <a:srgbClr val="F06292"/>
+      </a:accent5>
+      <a:accent6>
+        <a:srgbClr val="7890CD"/>
+      </a:accent6>
+      <a:hlink>
+        <a:srgbClr val="F06292"/>
+      </a:hlink>
+      <a:folHlink>
+        <a:srgbClr val="F06292"/>
+      </a:folHlink>
+    </a:clrScheme>
+    <a:fontScheme name="Office">
+      <a:majorFont>
+        <a:latin typeface="Arial"/>
+        <a:ea typeface=""/>
+        <a:cs typeface=""/>
+        <a:font script="Jpan" typeface="ＭＳ Ｐゴシック"/>
+        <a:font script="Hang" typeface="맑은 고딕"/>
+        <a:font script="Hans" typeface="宋体"/>
+        <a:font script="Hant" typeface="新細明體"/>
+        <a:font script="Arab" typeface="Times New Roman"/>
+        <a:font script="Hebr" typeface="Times New Roman"/>
+        <a:font script="Thai" typeface="Angsana New"/>
+        <a:font script="Ethi" typeface="Nyala"/>
+        <a:font script="Beng" typeface="Vrinda"/>
+        <a:font script="Gujr" typeface="Shruti"/>
+        <a:font script="Khmr" typeface="MoolBoran"/>
+        <a:font script="Knda" typeface="Tunga"/>
+        <a:font script="Guru" typeface="Raavi"/>
+        <a:font script="Cans" typeface="Euphemia"/>
+        <a:font script="Cher" typeface="Plantagenet Cherokee"/>
+        <a:font script="Yiii" typeface="Microsoft Yi Baiti"/>
+        <a:font script="Tibt" typeface="Microsoft Himalaya"/>
+        <a:font script="Thaa" typeface="MV Boli"/>
+        <a:font script="Deva" typeface="Mangal"/>
+        <a:font script="Telu" typeface="Gautami"/>
+        <a:font script="Taml" typeface="Latha"/>
+        <a:font script="Syrc" typeface="Estrangelo Edessa"/>
+        <a:font script="Orya" typeface="Kalinga"/>
+        <a:font script="Mlym" typeface="Kartika"/>
+        <a:font script="Laoo" typeface="DokChampa"/>
+        <a:font script="Sinh" typeface="Iskoola Pota"/>
+        <a:font script="Mong" typeface="Mongolian Baiti"/>
+        <a:font script="Viet" typeface="Times New Roman"/>
+        <a:font script="Uigh" typeface="Microsoft Uighur"/>
+        <a:font script="Geor" typeface="Sylfaen"/>
+      </a:majorFont>
+      <a:minorFont>
+        <a:latin typeface="Arial"/>
+        <a:ea typeface=""/>
+        <a:cs typeface=""/>
+        <a:font script="Jpan" typeface="ＭＳ Ｐゴシック"/>
+        <a:font script="Hang" typeface="맑은 고딕"/>
+        <a:font script="Hans" typeface="宋体"/>
+        <a:font script="Hant" typeface="新細明體"/>
+        <a:font script="Arab" typeface="Arial"/>
+        <a:font script="Hebr" typeface="Arial"/>
+        <a:font script="Thai" typeface="Cordia New"/>
+        <a:font script="Ethi" typeface="Nyala"/>
+        <a:font script="Beng" typeface="Vrinda"/>
+        <a:font script="Gujr" typeface="Shruti"/>
+        <a:font script="Khmr" typeface="DaunPenh"/>
+        <a:font script="Knda" typeface="Tunga"/>
+        <a:font script="Guru" typeface="Raavi"/>
+        <a:font script="Cans" typeface="Euphemia"/>
+        <a:font script="Cher" typeface="Plantagenet Cherokee"/>
+        <a:font script="Yiii" typeface="Microsoft Yi Baiti"/>
+        <a:font script="Tibt" typeface="Microsoft Himalaya"/>
+        <a:font script="Thaa" typeface="MV Boli"/>
+        <a:font script="Deva" typeface="Mangal"/>
+        <a:font script="Telu" typeface="Gautami"/>
+        <a:font script="Taml" typeface="Latha"/>
+        <a:font script="Syrc" typeface="Estrangelo Edessa"/>
+        <a:font script="Orya" typeface="Kalinga"/>
+        <a:font script="Mlym" typeface="Kartika"/>
+        <a:font script="Laoo" typeface="DokChampa"/>
+        <a:font script="Sinh" typeface="Iskoola Pota"/>
+        <a:font script="Mong" typeface="Mongolian Baiti"/>
+        <a:font script="Viet" typeface="Arial"/>
+        <a:font script="Uigh" typeface="Microsoft Uighur"/>
+        <a:font script="Geor" typeface="Sylfaen"/>
+      </a:minorFont>
+    </a:fontScheme>
+    <a:fmtScheme name="Office">
+      <a:fillStyleLst>
+        <a:solidFill>
+          <a:schemeClr val="phClr"/>
+        </a:solidFill>
+        <a:gradFill rotWithShape="1">
+          <a:gsLst>
+            <a:gs pos="0">
+              <a:schemeClr val="phClr">
+                <a:tint val="50000"/>
+                <a:satMod val="300000"/>
+              </a:schemeClr>
+            </a:gs>
+            <a:gs pos="35000">
+              <a:schemeClr val="phClr">
+                <a:tint val="37000"/>
+                <a:satMod val="300000"/>
+              </a:schemeClr>
+            </a:gs>
+            <a:gs pos="100000">
+              <a:schemeClr val="phClr">
+                <a:tint val="15000"/>
+                <a:satMod val="350000"/>
+              </a:schemeClr>
+            </a:gs>
+          </a:gsLst>
+          <a:lin ang="16200000" scaled="1"/>
+        </a:gradFill>
+        <a:gradFill rotWithShape="1">
+          <a:gsLst>
+            <a:gs pos="0">
+              <a:schemeClr val="phClr">
+                <a:tint val="100000"/>
+                <a:shade val="100000"/>
+                <a:satMod val="130000"/>
+              </a:schemeClr>
+            </a:gs>
+            <a:gs pos="100000">
+              <a:schemeClr val="phClr">
+                <a:tint val="50000"/>
+                <a:shade val="100000"/>
+                <a:satMod val="350000"/>
+              </a:schemeClr>
+            </a:gs>
+          </a:gsLst>
+          <a:lin ang="16200000" scaled="0"/>
+        </a:gradFill>
+      </a:fillStyleLst>
+      <a:lnStyleLst>
+        <a:ln w="9525" cap="flat" cmpd="sng" algn="ctr">
+          <a:solidFill>
+            <a:schemeClr val="phClr">
+              <a:shade val="95000"/>
+              <a:satMod val="105000"/>
+            </a:schemeClr>
+          </a:solidFill>
+          <a:prstDash val="solid"/>
+        </a:ln>
+        <a:ln w="25400" cap="flat" cmpd="sng" algn="ctr">
+          <a:solidFill>
+            <a:schemeClr val="phClr"/>
+          </a:solidFill>
+          <a:prstDash val="solid"/>
+        </a:ln>
+        <a:ln w="38100" cap="flat" cmpd="sng" algn="ctr">
+          <a:solidFill>
+            <a:schemeClr val="phClr"/>
+          </a:solidFill>
+          <a:prstDash val="solid"/>
+        </a:ln>
+      </a:lnStyleLst>
+      <a:effectStyleLst>
+        <a:effectStyle>
+          <a:effectLst>
+            <a:outerShdw blurRad="40000" dist="20000" dir="5400000" rotWithShape="0">
+              <a:srgbClr val="000000">
+                <a:alpha val="38000"/>
+              </a:srgbClr>
+            </a:outerShdw>
+          </a:effectLst>
+        </a:effectStyle>
+        <a:effectStyle>
+          <a:effectLst>
+            <a:outerShdw blurRad="40000" dist="23000" dir="5400000" rotWithShape="0">
+              <a:srgbClr val="000000">
+                <a:alpha val="35000"/>
+              </a:srgbClr>
+            </a:outerShdw>
+          </a:effectLst>
+        </a:effectStyle>
+        <a:effectStyle>
+          <a:effectLst>
+            <a:outerShdw blurRad="40000" dist="23000" dir="5400000" rotWithShape="0">
+              <a:srgbClr val="000000">
+                <a:alpha val="35000"/>
+              </a:srgbClr>
+            </a:outerShdw>
+          </a:effectLst>
+          <a:scene3d>
+            <a:camera prst="orthographicFront">
+              <a:rot lat="0" lon="0" rev="0"/>
+            </a:camera>
+            <a:lightRig rig="threePt" dir="t">
+              <a:rot lat="0" lon="0" rev="1200000"/>
+            </a:lightRig>
+          </a:scene3d>
+          <a:sp3d>
+            <a:bevelT w="63500" h="25400"/>
+          </a:sp3d>
+        </a:effectStyle>
+      </a:effectStyleLst>
+      <a:bgFillStyleLst>
+        <a:solidFill>
+          <a:schemeClr val="phClr"/>
+        </a:solidFill>
+        <a:gradFill rotWithShape="1">
+          <a:gsLst>
+            <a:gs pos="0">
+              <a:schemeClr val="phClr">
+                <a:tint val="40000"/>
+                <a:satMod val="350000"/>
+              </a:schemeClr>
+            </a:gs>
+            <a:gs pos="40000">
+              <a:schemeClr val="phClr">
+                <a:tint val="45000"/>
+                <a:shade val="99000"/>
+                <a:satMod val="350000"/>
+              </a:schemeClr>
+            </a:gs>
+            <a:gs pos="100000">
+              <a:schemeClr val="phClr">
+                <a:shade val="20000"/>
+                <a:satMod val="255000"/>
+              </a:schemeClr>
+            </a:gs>
+          </a:gsLst>
+          <a:path path="circle">
+            <a:fillToRect l="50000" t="-80000" r="50000" b="180000"/>
+          </a:path>
+        </a:gradFill>
+        <a:gradFill rotWithShape="1">
+          <a:gsLst>
+            <a:gs pos="0">
+              <a:schemeClr val="phClr">
+                <a:tint val="80000"/>
+                <a:satMod val="300000"/>
+              </a:schemeClr>
+            </a:gs>
+            <a:gs pos="100000">
+              <a:schemeClr val="phClr">
+                <a:shade val="30000"/>
+                <a:satMod val="200000"/>
+              </a:schemeClr>
+            </a:gs>
+          </a:gsLst>
+          <a:path path="circle">
+            <a:fillToRect l="50000" t="50000" r="50000" b="50000"/>
+          </a:path>
+        </a:gradFill>
+      </a:bgFillStyleLst>
+    </a:fmtScheme>
+  </a:themeElements>
+</a:theme>
+</file>
+
+<file path=ppt/theme/theme2.xml><?xml version="1.0" encoding="utf-8"?>
 <a:theme xmlns:a="http://schemas.openxmlformats.org/drawingml/2006/main" xmlns:r="http://schemas.openxmlformats.org/officeDocument/2006/relationships">
   <a:themeElements>
     <a:clrScheme name="Default">
@@ -10652,283 +10931,4 @@
     </a:fmtScheme>
   </a:themeElements>
 </a:theme>
-</file>
-
-<file path=ppt/theme/theme2.xml><?xml version="1.0" encoding="utf-8"?>
-<a:theme xmlns:a="http://schemas.openxmlformats.org/drawingml/2006/main" xmlns:r="http://schemas.openxmlformats.org/officeDocument/2006/relationships" name="Geometric">
-  <a:themeElements>
-    <a:clrScheme name="Geometric">
-      <a:dk1>
-        <a:srgbClr val="2A3990"/>
-      </a:dk1>
-      <a:lt1>
-        <a:srgbClr val="FFFFFF"/>
-      </a:lt1>
-      <a:dk2>
-        <a:srgbClr val="434343"/>
-      </a:dk2>
-      <a:lt2>
-        <a:srgbClr val="999999"/>
-      </a:lt2>
-      <a:accent1>
-        <a:srgbClr val="212D74"/>
-      </a:accent1>
-      <a:accent2>
-        <a:srgbClr val="3949AB"/>
-      </a:accent2>
-      <a:accent3>
-        <a:srgbClr val="9C254D"/>
-      </a:accent3>
-      <a:accent4>
-        <a:srgbClr val="D23369"/>
-      </a:accent4>
-      <a:accent5>
-        <a:srgbClr val="F06292"/>
-      </a:accent5>
-      <a:accent6>
-        <a:srgbClr val="7890CD"/>
-      </a:accent6>
-      <a:hlink>
-        <a:srgbClr val="F06292"/>
-      </a:hlink>
-      <a:folHlink>
-        <a:srgbClr val="F06292"/>
-      </a:folHlink>
-    </a:clrScheme>
-    <a:fontScheme name="Office">
-      <a:majorFont>
-        <a:latin typeface="Arial"/>
-        <a:ea typeface=""/>
-        <a:cs typeface=""/>
-        <a:font script="Jpan" typeface="ＭＳ Ｐゴシック"/>
-        <a:font script="Hang" typeface="맑은 고딕"/>
-        <a:font script="Hans" typeface="宋体"/>
-        <a:font script="Hant" typeface="新細明體"/>
-        <a:font script="Arab" typeface="Times New Roman"/>
-        <a:font script="Hebr" typeface="Times New Roman"/>
-        <a:font script="Thai" typeface="Angsana New"/>
-        <a:font script="Ethi" typeface="Nyala"/>
-        <a:font script="Beng" typeface="Vrinda"/>
-        <a:font script="Gujr" typeface="Shruti"/>
-        <a:font script="Khmr" typeface="MoolBoran"/>
-        <a:font script="Knda" typeface="Tunga"/>
-        <a:font script="Guru" typeface="Raavi"/>
-        <a:font script="Cans" typeface="Euphemia"/>
-        <a:font script="Cher" typeface="Plantagenet Cherokee"/>
-        <a:font script="Yiii" typeface="Microsoft Yi Baiti"/>
-        <a:font script="Tibt" typeface="Microsoft Himalaya"/>
-        <a:font script="Thaa" typeface="MV Boli"/>
-        <a:font script="Deva" typeface="Mangal"/>
-        <a:font script="Telu" typeface="Gautami"/>
-        <a:font script="Taml" typeface="Latha"/>
-        <a:font script="Syrc" typeface="Estrangelo Edessa"/>
-        <a:font script="Orya" typeface="Kalinga"/>
-        <a:font script="Mlym" typeface="Kartika"/>
-        <a:font script="Laoo" typeface="DokChampa"/>
-        <a:font script="Sinh" typeface="Iskoola Pota"/>
-        <a:font script="Mong" typeface="Mongolian Baiti"/>
-        <a:font script="Viet" typeface="Times New Roman"/>
-        <a:font script="Uigh" typeface="Microsoft Uighur"/>
-        <a:font script="Geor" typeface="Sylfaen"/>
-      </a:majorFont>
-      <a:minorFont>
-        <a:latin typeface="Arial"/>
-        <a:ea typeface=""/>
-        <a:cs typeface=""/>
-        <a:font script="Jpan" typeface="ＭＳ Ｐゴシック"/>
-        <a:font script="Hang" typeface="맑은 고딕"/>
-        <a:font script="Hans" typeface="宋体"/>
-        <a:font script="Hant" typeface="新細明體"/>
-        <a:font script="Arab" typeface="Arial"/>
-        <a:font script="Hebr" typeface="Arial"/>
-        <a:font script="Thai" typeface="Cordia New"/>
-        <a:font script="Ethi" typeface="Nyala"/>
-        <a:font script="Beng" typeface="Vrinda"/>
-        <a:font script="Gujr" typeface="Shruti"/>
-        <a:font script="Khmr" typeface="DaunPenh"/>
-        <a:font script="Knda" typeface="Tunga"/>
-        <a:font script="Guru" typeface="Raavi"/>
-        <a:font script="Cans" typeface="Euphemia"/>
-        <a:font script="Cher" typeface="Plantagenet Cherokee"/>
-        <a:font script="Yiii" typeface="Microsoft Yi Baiti"/>
-        <a:font script="Tibt" typeface="Microsoft Himalaya"/>
-        <a:font script="Thaa" typeface="MV Boli"/>
-        <a:font script="Deva" typeface="Mangal"/>
-        <a:font script="Telu" typeface="Gautami"/>
-        <a:font script="Taml" typeface="Latha"/>
-        <a:font script="Syrc" typeface="Estrangelo Edessa"/>
-        <a:font script="Orya" typeface="Kalinga"/>
-        <a:font script="Mlym" typeface="Kartika"/>
-        <a:font script="Laoo" typeface="DokChampa"/>
-        <a:font script="Sinh" typeface="Iskoola Pota"/>
-        <a:font script="Mong" typeface="Mongolian Baiti"/>
-        <a:font script="Viet" typeface="Arial"/>
-        <a:font script="Uigh" typeface="Microsoft Uighur"/>
-        <a:font script="Geor" typeface="Sylfaen"/>
-      </a:minorFont>
-    </a:fontScheme>
-    <a:fmtScheme name="Office">
-      <a:fillStyleLst>
-        <a:solidFill>
-          <a:schemeClr val="phClr"/>
-        </a:solidFill>
-        <a:gradFill rotWithShape="1">
-          <a:gsLst>
-            <a:gs pos="0">
-              <a:schemeClr val="phClr">
-                <a:tint val="50000"/>
-                <a:satMod val="300000"/>
-              </a:schemeClr>
-            </a:gs>
-            <a:gs pos="35000">
-              <a:schemeClr val="phClr">
-                <a:tint val="37000"/>
-                <a:satMod val="300000"/>
-              </a:schemeClr>
-            </a:gs>
-            <a:gs pos="100000">
-              <a:schemeClr val="phClr">
-                <a:tint val="15000"/>
-                <a:satMod val="350000"/>
-              </a:schemeClr>
-            </a:gs>
-          </a:gsLst>
-          <a:lin ang="16200000" scaled="1"/>
-        </a:gradFill>
-        <a:gradFill rotWithShape="1">
-          <a:gsLst>
-            <a:gs pos="0">
-              <a:schemeClr val="phClr">
-                <a:tint val="100000"/>
-                <a:shade val="100000"/>
-                <a:satMod val="130000"/>
-              </a:schemeClr>
-            </a:gs>
-            <a:gs pos="100000">
-              <a:schemeClr val="phClr">
-                <a:tint val="50000"/>
-                <a:shade val="100000"/>
-                <a:satMod val="350000"/>
-              </a:schemeClr>
-            </a:gs>
-          </a:gsLst>
-          <a:lin ang="16200000" scaled="0"/>
-        </a:gradFill>
-      </a:fillStyleLst>
-      <a:lnStyleLst>
-        <a:ln w="9525" cap="flat" cmpd="sng" algn="ctr">
-          <a:solidFill>
-            <a:schemeClr val="phClr">
-              <a:shade val="95000"/>
-              <a:satMod val="105000"/>
-            </a:schemeClr>
-          </a:solidFill>
-          <a:prstDash val="solid"/>
-        </a:ln>
-        <a:ln w="25400" cap="flat" cmpd="sng" algn="ctr">
-          <a:solidFill>
-            <a:schemeClr val="phClr"/>
-          </a:solidFill>
-          <a:prstDash val="solid"/>
-        </a:ln>
-        <a:ln w="38100" cap="flat" cmpd="sng" algn="ctr">
-          <a:solidFill>
-            <a:schemeClr val="phClr"/>
-          </a:solidFill>
-          <a:prstDash val="solid"/>
-        </a:ln>
-      </a:lnStyleLst>
-      <a:effectStyleLst>
-        <a:effectStyle>
-          <a:effectLst>
-            <a:outerShdw blurRad="40000" dist="20000" dir="5400000" rotWithShape="0">
-              <a:srgbClr val="000000">
-                <a:alpha val="38000"/>
-              </a:srgbClr>
-            </a:outerShdw>
-          </a:effectLst>
-        </a:effectStyle>
-        <a:effectStyle>
-          <a:effectLst>
-            <a:outerShdw blurRad="40000" dist="23000" dir="5400000" rotWithShape="0">
-              <a:srgbClr val="000000">
-                <a:alpha val="35000"/>
-              </a:srgbClr>
-            </a:outerShdw>
-          </a:effectLst>
-        </a:effectStyle>
-        <a:effectStyle>
-          <a:effectLst>
-            <a:outerShdw blurRad="40000" dist="23000" dir="5400000" rotWithShape="0">
-              <a:srgbClr val="000000">
-                <a:alpha val="35000"/>
-              </a:srgbClr>
-            </a:outerShdw>
-          </a:effectLst>
-          <a:scene3d>
-            <a:camera prst="orthographicFront">
-              <a:rot lat="0" lon="0" rev="0"/>
-            </a:camera>
-            <a:lightRig rig="threePt" dir="t">
-              <a:rot lat="0" lon="0" rev="1200000"/>
-            </a:lightRig>
-          </a:scene3d>
-          <a:sp3d>
-            <a:bevelT w="63500" h="25400"/>
-          </a:sp3d>
-        </a:effectStyle>
-      </a:effectStyleLst>
-      <a:bgFillStyleLst>
-        <a:solidFill>
-          <a:schemeClr val="phClr"/>
-        </a:solidFill>
-        <a:gradFill rotWithShape="1">
-          <a:gsLst>
-            <a:gs pos="0">
-              <a:schemeClr val="phClr">
-                <a:tint val="40000"/>
-                <a:satMod val="350000"/>
-              </a:schemeClr>
-            </a:gs>
-            <a:gs pos="40000">
-              <a:schemeClr val="phClr">
-                <a:tint val="45000"/>
-                <a:shade val="99000"/>
-                <a:satMod val="350000"/>
-              </a:schemeClr>
-            </a:gs>
-            <a:gs pos="100000">
-              <a:schemeClr val="phClr">
-                <a:shade val="20000"/>
-                <a:satMod val="255000"/>
-              </a:schemeClr>
-            </a:gs>
-          </a:gsLst>
-          <a:path path="circle">
-            <a:fillToRect l="50000" t="-80000" r="50000" b="180000"/>
-          </a:path>
-        </a:gradFill>
-        <a:gradFill rotWithShape="1">
-          <a:gsLst>
-            <a:gs pos="0">
-              <a:schemeClr val="phClr">
-                <a:tint val="80000"/>
-                <a:satMod val="300000"/>
-              </a:schemeClr>
-            </a:gs>
-            <a:gs pos="100000">
-              <a:schemeClr val="phClr">
-                <a:shade val="30000"/>
-                <a:satMod val="200000"/>
-              </a:schemeClr>
-            </a:gs>
-          </a:gsLst>
-          <a:path path="circle">
-            <a:fillToRect l="50000" t="50000" r="50000" b="50000"/>
-          </a:path>
-        </a:gradFill>
-      </a:bgFillStyleLst>
-    </a:fmtScheme>
-  </a:themeElements>
-</a:theme>
 </file>
</xml_diff>